<commit_message>
Corrected: 4ten zu 4.
</commit_message>
<xml_diff>
--- a/Documents/Präsentationen/Anfangspräsentation/Anfangspräsentation.pptx
+++ b/Documents/Präsentationen/Anfangspräsentation/Anfangspräsentation.pptx
@@ -12286,7 +12286,7 @@
           <a:p>
             <a:fld id="{ED291B17-9318-49DB-B28B-6E5994AE9581}" type="datetime1">
               <a:rPr lang="en-US" smtClean="0"/>
-              <a:t>9/29/2020</a:t>
+              <a:t>10/5/2020</a:t>
             </a:fld>
             <a:endParaRPr lang="en-US" dirty="0"/>
           </a:p>
@@ -12489,7 +12489,7 @@
           <a:p>
             <a:fld id="{2CED4963-E985-44C4-B8C4-FDD613B7C2F8}" type="datetime1">
               <a:rPr lang="en-US" smtClean="0"/>
-              <a:t>9/29/2020</a:t>
+              <a:t>10/5/2020</a:t>
             </a:fld>
             <a:endParaRPr lang="en-US" dirty="0"/>
           </a:p>
@@ -12851,7 +12851,7 @@
           <a:p>
             <a:fld id="{ED291B17-9318-49DB-B28B-6E5994AE9581}" type="datetime1">
               <a:rPr lang="en-US" smtClean="0"/>
-              <a:t>9/29/2020</a:t>
+              <a:t>10/5/2020</a:t>
             </a:fld>
             <a:endParaRPr lang="en-US" dirty="0"/>
           </a:p>
@@ -13049,7 +13049,7 @@
           <a:p>
             <a:fld id="{78DD82B9-B8EE-4375-B6FF-88FA6ABB15D9}" type="datetime1">
               <a:rPr lang="en-US" smtClean="0"/>
-              <a:t>9/29/2020</a:t>
+              <a:t>10/5/2020</a:t>
             </a:fld>
             <a:endParaRPr lang="en-US" dirty="0"/>
           </a:p>
@@ -13361,7 +13361,7 @@
           <a:p>
             <a:fld id="{B2497495-0637-405E-AE64-5CC7506D51F5}" type="datetime1">
               <a:rPr lang="en-US" smtClean="0"/>
-              <a:t>9/29/2020</a:t>
+              <a:t>10/5/2020</a:t>
             </a:fld>
             <a:endParaRPr lang="en-US" dirty="0"/>
           </a:p>
@@ -13614,7 +13614,7 @@
           <a:p>
             <a:fld id="{7BFFD690-9426-415D-8B65-26881E07B2D4}" type="datetime1">
               <a:rPr lang="en-US" smtClean="0"/>
-              <a:t>9/29/2020</a:t>
+              <a:t>10/5/2020</a:t>
             </a:fld>
             <a:endParaRPr lang="en-US" dirty="0"/>
           </a:p>
@@ -14036,7 +14036,7 @@
           <a:p>
             <a:fld id="{04C4989A-474C-40DE-95B9-011C28B71673}" type="datetime1">
               <a:rPr lang="en-US" smtClean="0"/>
-              <a:t>9/29/2020</a:t>
+              <a:t>10/5/2020</a:t>
             </a:fld>
             <a:endParaRPr lang="en-US" dirty="0"/>
           </a:p>
@@ -14159,7 +14159,7 @@
           <a:p>
             <a:fld id="{5DB4ED54-5B5E-4A04-93D3-5772E3CE3818}" type="datetime1">
               <a:rPr lang="en-US" smtClean="0"/>
-              <a:t>9/29/2020</a:t>
+              <a:t>10/5/2020</a:t>
             </a:fld>
             <a:endParaRPr lang="en-US" dirty="0"/>
           </a:p>
@@ -14254,7 +14254,7 @@
           <a:p>
             <a:fld id="{4EDE50D6-574B-40AF-946F-D52A04ADE379}" type="datetime1">
               <a:rPr lang="en-US" smtClean="0"/>
-              <a:t>9/29/2020</a:t>
+              <a:t>10/5/2020</a:t>
             </a:fld>
             <a:endParaRPr lang="en-US" dirty="0"/>
           </a:p>
@@ -14631,7 +14631,7 @@
           <a:p>
             <a:fld id="{D82884F1-FFEA-405F-9602-3DCA865EDA4E}" type="datetime1">
               <a:rPr lang="en-US" smtClean="0"/>
-              <a:t>9/29/2020</a:t>
+              <a:t>10/5/2020</a:t>
             </a:fld>
             <a:endParaRPr lang="en-US" dirty="0"/>
           </a:p>
@@ -14924,7 +14924,7 @@
           <a:p>
             <a:fld id="{7E18DB4A-8810-4A10-AD5C-D5E2C667F5B3}" type="datetime1">
               <a:rPr lang="en-US" smtClean="0"/>
-              <a:t>9/29/2020</a:t>
+              <a:t>10/5/2020</a:t>
             </a:fld>
             <a:endParaRPr lang="en-US" dirty="0"/>
           </a:p>
@@ -15145,7 +15145,7 @@
           <a:p>
             <a:fld id="{ED291B17-9318-49DB-B28B-6E5994AE9581}" type="datetime1">
               <a:rPr lang="en-US" smtClean="0"/>
-              <a:t>9/29/2020</a:t>
+              <a:t>10/5/2020</a:t>
             </a:fld>
             <a:endParaRPr lang="en-US" dirty="0"/>
           </a:p>
@@ -16261,8 +16261,13 @@
             </a:pPr>
             <a:r>
               <a:rPr lang="de-DE" sz="2000" dirty="0"/>
-              <a:t>     2. Semesters der 4ten Klasse</a:t>
+              <a:t>     2. Semesters </a:t>
             </a:r>
+            <a:r>
+              <a:rPr lang="de-DE" sz="2000"/>
+              <a:t>der 4.Klasse</a:t>
+            </a:r>
+            <a:endParaRPr lang="de-DE" sz="2000" dirty="0"/>
           </a:p>
           <a:p>
             <a:r>

</xml_diff>